<commit_message>
refine chapter 1 with figures
</commit_message>
<xml_diff>
--- a/raw_figs/figs.pptx
+++ b/raw_figs/figs.pptx
@@ -14,14 +14,15 @@
     <p:sldId id="262" r:id="rId8"/>
     <p:sldId id="264" r:id="rId9"/>
     <p:sldId id="263" r:id="rId10"/>
-    <p:sldId id="266" r:id="rId11"/>
-    <p:sldId id="272" r:id="rId12"/>
-    <p:sldId id="267" r:id="rId13"/>
-    <p:sldId id="271" r:id="rId14"/>
-    <p:sldId id="270" r:id="rId15"/>
-    <p:sldId id="268" r:id="rId16"/>
-    <p:sldId id="269" r:id="rId17"/>
-    <p:sldId id="273" r:id="rId18"/>
+    <p:sldId id="274" r:id="rId11"/>
+    <p:sldId id="266" r:id="rId12"/>
+    <p:sldId id="272" r:id="rId13"/>
+    <p:sldId id="267" r:id="rId14"/>
+    <p:sldId id="271" r:id="rId15"/>
+    <p:sldId id="270" r:id="rId16"/>
+    <p:sldId id="268" r:id="rId17"/>
+    <p:sldId id="269" r:id="rId18"/>
+    <p:sldId id="273" r:id="rId19"/>
   </p:sldIdLst>
   <p:sldSz cx="12192000" cy="6858000"/>
   <p:notesSz cx="6858000" cy="9144000"/>
@@ -277,7 +278,7 @@
           <a:p>
             <a:fld id="{EB591767-9AD6-9945-9696-D8DEDE2548E5}" type="datetimeFigureOut">
               <a:rPr lang="en-US" smtClean="0"/>
-              <a:t>12/24/25</a:t>
+              <a:t>12/26/25</a:t>
             </a:fld>
             <a:endParaRPr lang="en-US"/>
           </a:p>
@@ -477,7 +478,7 @@
           <a:p>
             <a:fld id="{EB591767-9AD6-9945-9696-D8DEDE2548E5}" type="datetimeFigureOut">
               <a:rPr lang="en-US" smtClean="0"/>
-              <a:t>12/24/25</a:t>
+              <a:t>12/26/25</a:t>
             </a:fld>
             <a:endParaRPr lang="en-US"/>
           </a:p>
@@ -687,7 +688,7 @@
           <a:p>
             <a:fld id="{EB591767-9AD6-9945-9696-D8DEDE2548E5}" type="datetimeFigureOut">
               <a:rPr lang="en-US" smtClean="0"/>
-              <a:t>12/24/25</a:t>
+              <a:t>12/26/25</a:t>
             </a:fld>
             <a:endParaRPr lang="en-US"/>
           </a:p>
@@ -887,7 +888,7 @@
           <a:p>
             <a:fld id="{EB591767-9AD6-9945-9696-D8DEDE2548E5}" type="datetimeFigureOut">
               <a:rPr lang="en-US" smtClean="0"/>
-              <a:t>12/24/25</a:t>
+              <a:t>12/26/25</a:t>
             </a:fld>
             <a:endParaRPr lang="en-US"/>
           </a:p>
@@ -1163,7 +1164,7 @@
           <a:p>
             <a:fld id="{EB591767-9AD6-9945-9696-D8DEDE2548E5}" type="datetimeFigureOut">
               <a:rPr lang="en-US" smtClean="0"/>
-              <a:t>12/24/25</a:t>
+              <a:t>12/26/25</a:t>
             </a:fld>
             <a:endParaRPr lang="en-US"/>
           </a:p>
@@ -1431,7 +1432,7 @@
           <a:p>
             <a:fld id="{EB591767-9AD6-9945-9696-D8DEDE2548E5}" type="datetimeFigureOut">
               <a:rPr lang="en-US" smtClean="0"/>
-              <a:t>12/24/25</a:t>
+              <a:t>12/26/25</a:t>
             </a:fld>
             <a:endParaRPr lang="en-US"/>
           </a:p>
@@ -1846,7 +1847,7 @@
           <a:p>
             <a:fld id="{EB591767-9AD6-9945-9696-D8DEDE2548E5}" type="datetimeFigureOut">
               <a:rPr lang="en-US" smtClean="0"/>
-              <a:t>12/24/25</a:t>
+              <a:t>12/26/25</a:t>
             </a:fld>
             <a:endParaRPr lang="en-US"/>
           </a:p>
@@ -1988,7 +1989,7 @@
           <a:p>
             <a:fld id="{EB591767-9AD6-9945-9696-D8DEDE2548E5}" type="datetimeFigureOut">
               <a:rPr lang="en-US" smtClean="0"/>
-              <a:t>12/24/25</a:t>
+              <a:t>12/26/25</a:t>
             </a:fld>
             <a:endParaRPr lang="en-US"/>
           </a:p>
@@ -2101,7 +2102,7 @@
           <a:p>
             <a:fld id="{EB591767-9AD6-9945-9696-D8DEDE2548E5}" type="datetimeFigureOut">
               <a:rPr lang="en-US" smtClean="0"/>
-              <a:t>12/24/25</a:t>
+              <a:t>12/26/25</a:t>
             </a:fld>
             <a:endParaRPr lang="en-US"/>
           </a:p>
@@ -2414,7 +2415,7 @@
           <a:p>
             <a:fld id="{EB591767-9AD6-9945-9696-D8DEDE2548E5}" type="datetimeFigureOut">
               <a:rPr lang="en-US" smtClean="0"/>
-              <a:t>12/24/25</a:t>
+              <a:t>12/26/25</a:t>
             </a:fld>
             <a:endParaRPr lang="en-US"/>
           </a:p>
@@ -2703,7 +2704,7 @@
           <a:p>
             <a:fld id="{EB591767-9AD6-9945-9696-D8DEDE2548E5}" type="datetimeFigureOut">
               <a:rPr lang="en-US" smtClean="0"/>
-              <a:t>12/24/25</a:t>
+              <a:t>12/26/25</a:t>
             </a:fld>
             <a:endParaRPr lang="en-US"/>
           </a:p>
@@ -2946,7 +2947,7 @@
           <a:p>
             <a:fld id="{EB591767-9AD6-9945-9696-D8DEDE2548E5}" type="datetimeFigureOut">
               <a:rPr lang="en-US" smtClean="0"/>
-              <a:t>12/24/25</a:t>
+              <a:t>12/26/25</a:t>
             </a:fld>
             <a:endParaRPr lang="en-US"/>
           </a:p>
@@ -4918,6 +4919,1186 @@
 </file>
 
 <file path=ppt/slides/slide10.xml><?xml version="1.0" encoding="utf-8"?>
+<p:sld xmlns:a="http://schemas.openxmlformats.org/drawingml/2006/main" xmlns:r="http://schemas.openxmlformats.org/officeDocument/2006/relationships" xmlns:p="http://schemas.openxmlformats.org/presentationml/2006/main">
+  <p:cSld>
+    <p:spTree>
+      <p:nvGrpSpPr>
+        <p:cNvPr id="1" name="">
+          <a:extLst>
+            <a:ext uri="{FF2B5EF4-FFF2-40B4-BE49-F238E27FC236}">
+              <a16:creationId xmlns:a16="http://schemas.microsoft.com/office/drawing/2014/main" id="{12E3DA8F-85BC-8565-D234-07BFDB998B26}"/>
+            </a:ext>
+          </a:extLst>
+        </p:cNvPr>
+        <p:cNvGrpSpPr/>
+        <p:nvPr/>
+      </p:nvGrpSpPr>
+      <p:grpSpPr>
+        <a:xfrm>
+          <a:off x="0" y="0"/>
+          <a:ext cx="0" cy="0"/>
+          <a:chOff x="0" y="0"/>
+          <a:chExt cx="0" cy="0"/>
+        </a:xfrm>
+      </p:grpSpPr>
+      <p:sp>
+        <p:nvSpPr>
+          <p:cNvPr id="15" name="矩形 14">
+            <a:extLst>
+              <a:ext uri="{FF2B5EF4-FFF2-40B4-BE49-F238E27FC236}">
+                <a16:creationId xmlns:a16="http://schemas.microsoft.com/office/drawing/2014/main" id="{4A589A8A-94E8-F94D-A256-A69E4A09B2CC}"/>
+              </a:ext>
+            </a:extLst>
+          </p:cNvPr>
+          <p:cNvSpPr/>
+          <p:nvPr/>
+        </p:nvSpPr>
+        <p:spPr>
+          <a:xfrm>
+            <a:off x="1162878" y="646043"/>
+            <a:ext cx="5086847" cy="3544957"/>
+          </a:xfrm>
+          <a:prstGeom prst="rect">
+            <a:avLst/>
+          </a:prstGeom>
+          <a:noFill/>
+          <a:ln w="63500">
+            <a:solidFill>
+              <a:schemeClr val="accent6">
+                <a:lumMod val="75000"/>
+              </a:schemeClr>
+            </a:solidFill>
+          </a:ln>
+        </p:spPr>
+        <p:style>
+          <a:lnRef idx="2">
+            <a:schemeClr val="accent1">
+              <a:shade val="15000"/>
+            </a:schemeClr>
+          </a:lnRef>
+          <a:fillRef idx="1">
+            <a:schemeClr val="accent1"/>
+          </a:fillRef>
+          <a:effectRef idx="0">
+            <a:schemeClr val="accent1"/>
+          </a:effectRef>
+          <a:fontRef idx="minor">
+            <a:schemeClr val="lt1"/>
+          </a:fontRef>
+        </p:style>
+        <p:txBody>
+          <a:bodyPr rtlCol="0" anchor="ctr"/>
+          <a:lstStyle/>
+          <a:p>
+            <a:pPr algn="ctr"/>
+            <a:endParaRPr lang="en-US" dirty="0">
+              <a:solidFill>
+                <a:schemeClr val="tx1"/>
+              </a:solidFill>
+            </a:endParaRPr>
+          </a:p>
+        </p:txBody>
+      </p:sp>
+      <p:sp>
+        <p:nvSpPr>
+          <p:cNvPr id="7" name="矩形 6">
+            <a:extLst>
+              <a:ext uri="{FF2B5EF4-FFF2-40B4-BE49-F238E27FC236}">
+                <a16:creationId xmlns:a16="http://schemas.microsoft.com/office/drawing/2014/main" id="{A995AA69-0A6A-DD4B-F3E6-A35C076D60C9}"/>
+              </a:ext>
+            </a:extLst>
+          </p:cNvPr>
+          <p:cNvSpPr/>
+          <p:nvPr/>
+        </p:nvSpPr>
+        <p:spPr>
+          <a:xfrm>
+            <a:off x="1469279" y="906566"/>
+            <a:ext cx="1158308" cy="2996568"/>
+          </a:xfrm>
+          <a:prstGeom prst="rect">
+            <a:avLst/>
+          </a:prstGeom>
+          <a:solidFill>
+            <a:schemeClr val="accent6">
+              <a:lumMod val="20000"/>
+              <a:lumOff val="80000"/>
+            </a:schemeClr>
+          </a:solidFill>
+        </p:spPr>
+        <p:style>
+          <a:lnRef idx="2">
+            <a:schemeClr val="accent1">
+              <a:shade val="15000"/>
+            </a:schemeClr>
+          </a:lnRef>
+          <a:fillRef idx="1">
+            <a:schemeClr val="accent1"/>
+          </a:fillRef>
+          <a:effectRef idx="0">
+            <a:schemeClr val="accent1"/>
+          </a:effectRef>
+          <a:fontRef idx="minor">
+            <a:schemeClr val="lt1"/>
+          </a:fontRef>
+        </p:style>
+        <p:txBody>
+          <a:bodyPr rtlCol="0" anchor="ctr"/>
+          <a:lstStyle/>
+          <a:p>
+            <a:pPr algn="ctr"/>
+            <a:endParaRPr lang="en-US">
+              <a:solidFill>
+                <a:schemeClr val="tx1"/>
+              </a:solidFill>
+            </a:endParaRPr>
+          </a:p>
+        </p:txBody>
+      </p:sp>
+      <p:sp>
+        <p:nvSpPr>
+          <p:cNvPr id="9" name="矩形 8">
+            <a:extLst>
+              <a:ext uri="{FF2B5EF4-FFF2-40B4-BE49-F238E27FC236}">
+                <a16:creationId xmlns:a16="http://schemas.microsoft.com/office/drawing/2014/main" id="{DD8768BB-F839-54BC-7447-515C234C102E}"/>
+              </a:ext>
+            </a:extLst>
+          </p:cNvPr>
+          <p:cNvSpPr/>
+          <p:nvPr/>
+        </p:nvSpPr>
+        <p:spPr>
+          <a:xfrm>
+            <a:off x="1649895" y="1051835"/>
+            <a:ext cx="795130" cy="765313"/>
+          </a:xfrm>
+          <a:prstGeom prst="rect">
+            <a:avLst/>
+          </a:prstGeom>
+          <a:solidFill>
+            <a:schemeClr val="accent6">
+              <a:lumMod val="40000"/>
+              <a:lumOff val="60000"/>
+            </a:schemeClr>
+          </a:solidFill>
+          <a:ln w="12700"/>
+        </p:spPr>
+        <p:style>
+          <a:lnRef idx="2">
+            <a:schemeClr val="accent1">
+              <a:shade val="15000"/>
+            </a:schemeClr>
+          </a:lnRef>
+          <a:fillRef idx="1">
+            <a:schemeClr val="accent1"/>
+          </a:fillRef>
+          <a:effectRef idx="0">
+            <a:schemeClr val="accent1"/>
+          </a:effectRef>
+          <a:fontRef idx="minor">
+            <a:schemeClr val="lt1"/>
+          </a:fontRef>
+        </p:style>
+        <p:txBody>
+          <a:bodyPr rtlCol="0" anchor="ctr"/>
+          <a:lstStyle/>
+          <a:p>
+            <a:pPr algn="ctr"/>
+            <a:r>
+              <a:rPr lang="en-US" dirty="0">
+                <a:solidFill>
+                  <a:schemeClr val="tx1"/>
+                </a:solidFill>
+              </a:rPr>
+              <a:t>SM</a:t>
+            </a:r>
+          </a:p>
+        </p:txBody>
+      </p:sp>
+      <p:sp>
+        <p:nvSpPr>
+          <p:cNvPr id="10" name="矩形 9">
+            <a:extLst>
+              <a:ext uri="{FF2B5EF4-FFF2-40B4-BE49-F238E27FC236}">
+                <a16:creationId xmlns:a16="http://schemas.microsoft.com/office/drawing/2014/main" id="{3011F3A5-165D-4633-3403-D46315EF76C3}"/>
+              </a:ext>
+            </a:extLst>
+          </p:cNvPr>
+          <p:cNvSpPr/>
+          <p:nvPr/>
+        </p:nvSpPr>
+        <p:spPr>
+          <a:xfrm>
+            <a:off x="1649895" y="1903340"/>
+            <a:ext cx="795130" cy="765313"/>
+          </a:xfrm>
+          <a:prstGeom prst="rect">
+            <a:avLst/>
+          </a:prstGeom>
+          <a:solidFill>
+            <a:schemeClr val="accent6">
+              <a:lumMod val="40000"/>
+              <a:lumOff val="60000"/>
+            </a:schemeClr>
+          </a:solidFill>
+          <a:ln w="12700"/>
+        </p:spPr>
+        <p:style>
+          <a:lnRef idx="2">
+            <a:schemeClr val="accent1">
+              <a:shade val="15000"/>
+            </a:schemeClr>
+          </a:lnRef>
+          <a:fillRef idx="1">
+            <a:schemeClr val="accent1"/>
+          </a:fillRef>
+          <a:effectRef idx="0">
+            <a:schemeClr val="accent1"/>
+          </a:effectRef>
+          <a:fontRef idx="minor">
+            <a:schemeClr val="lt1"/>
+          </a:fontRef>
+        </p:style>
+        <p:txBody>
+          <a:bodyPr rtlCol="0" anchor="ctr"/>
+          <a:lstStyle/>
+          <a:p>
+            <a:pPr algn="ctr"/>
+            <a:r>
+              <a:rPr lang="en-US" dirty="0">
+                <a:solidFill>
+                  <a:schemeClr val="tx1"/>
+                </a:solidFill>
+              </a:rPr>
+              <a:t>SM</a:t>
+            </a:r>
+          </a:p>
+        </p:txBody>
+      </p:sp>
+      <p:sp>
+        <p:nvSpPr>
+          <p:cNvPr id="11" name="矩形 10">
+            <a:extLst>
+              <a:ext uri="{FF2B5EF4-FFF2-40B4-BE49-F238E27FC236}">
+                <a16:creationId xmlns:a16="http://schemas.microsoft.com/office/drawing/2014/main" id="{54C2A3DE-FDA0-2681-7097-ACF00E16CDF3}"/>
+              </a:ext>
+            </a:extLst>
+          </p:cNvPr>
+          <p:cNvSpPr/>
+          <p:nvPr/>
+        </p:nvSpPr>
+        <p:spPr>
+          <a:xfrm>
+            <a:off x="1649895" y="2754845"/>
+            <a:ext cx="795130" cy="765313"/>
+          </a:xfrm>
+          <a:prstGeom prst="rect">
+            <a:avLst/>
+          </a:prstGeom>
+          <a:solidFill>
+            <a:schemeClr val="accent6">
+              <a:lumMod val="40000"/>
+              <a:lumOff val="60000"/>
+            </a:schemeClr>
+          </a:solidFill>
+          <a:ln w="12700"/>
+        </p:spPr>
+        <p:style>
+          <a:lnRef idx="2">
+            <a:schemeClr val="accent1">
+              <a:shade val="15000"/>
+            </a:schemeClr>
+          </a:lnRef>
+          <a:fillRef idx="1">
+            <a:schemeClr val="accent1"/>
+          </a:fillRef>
+          <a:effectRef idx="0">
+            <a:schemeClr val="accent1"/>
+          </a:effectRef>
+          <a:fontRef idx="minor">
+            <a:schemeClr val="lt1"/>
+          </a:fontRef>
+        </p:style>
+        <p:txBody>
+          <a:bodyPr rtlCol="0" anchor="ctr"/>
+          <a:lstStyle/>
+          <a:p>
+            <a:pPr algn="ctr"/>
+            <a:r>
+              <a:rPr lang="en-US" dirty="0">
+                <a:solidFill>
+                  <a:schemeClr val="tx1"/>
+                </a:solidFill>
+              </a:rPr>
+              <a:t>SM</a:t>
+            </a:r>
+          </a:p>
+        </p:txBody>
+      </p:sp>
+      <p:sp>
+        <p:nvSpPr>
+          <p:cNvPr id="12" name="矩形 11">
+            <a:extLst>
+              <a:ext uri="{FF2B5EF4-FFF2-40B4-BE49-F238E27FC236}">
+                <a16:creationId xmlns:a16="http://schemas.microsoft.com/office/drawing/2014/main" id="{A38026C3-8ED2-C153-118A-0466EEEFFE81}"/>
+              </a:ext>
+            </a:extLst>
+          </p:cNvPr>
+          <p:cNvSpPr/>
+          <p:nvPr/>
+        </p:nvSpPr>
+        <p:spPr>
+          <a:xfrm>
+            <a:off x="3340096" y="906565"/>
+            <a:ext cx="2489011" cy="2996569"/>
+          </a:xfrm>
+          <a:prstGeom prst="rect">
+            <a:avLst/>
+          </a:prstGeom>
+          <a:noFill/>
+          <a:ln>
+            <a:solidFill>
+              <a:schemeClr val="accent6">
+                <a:lumMod val="75000"/>
+              </a:schemeClr>
+            </a:solidFill>
+            <a:prstDash val="dash"/>
+          </a:ln>
+        </p:spPr>
+        <p:style>
+          <a:lnRef idx="2">
+            <a:schemeClr val="accent1">
+              <a:shade val="15000"/>
+            </a:schemeClr>
+          </a:lnRef>
+          <a:fillRef idx="1">
+            <a:schemeClr val="accent1"/>
+          </a:fillRef>
+          <a:effectRef idx="0">
+            <a:schemeClr val="accent1"/>
+          </a:effectRef>
+          <a:fontRef idx="minor">
+            <a:schemeClr val="lt1"/>
+          </a:fontRef>
+        </p:style>
+        <p:txBody>
+          <a:bodyPr rtlCol="0" anchor="ctr"/>
+          <a:lstStyle/>
+          <a:p>
+            <a:pPr algn="ctr"/>
+            <a:endParaRPr lang="en-US" dirty="0">
+              <a:solidFill>
+                <a:schemeClr val="tx1"/>
+              </a:solidFill>
+            </a:endParaRPr>
+          </a:p>
+        </p:txBody>
+      </p:sp>
+      <p:sp>
+        <p:nvSpPr>
+          <p:cNvPr id="13" name="矩形 12">
+            <a:extLst>
+              <a:ext uri="{FF2B5EF4-FFF2-40B4-BE49-F238E27FC236}">
+                <a16:creationId xmlns:a16="http://schemas.microsoft.com/office/drawing/2014/main" id="{2A76A83A-9CE1-38C4-25A8-1099CDEF0162}"/>
+              </a:ext>
+            </a:extLst>
+          </p:cNvPr>
+          <p:cNvSpPr/>
+          <p:nvPr/>
+        </p:nvSpPr>
+        <p:spPr>
+          <a:xfrm>
+            <a:off x="1759225" y="3340744"/>
+            <a:ext cx="576470" cy="765313"/>
+          </a:xfrm>
+          <a:prstGeom prst="rect">
+            <a:avLst/>
+          </a:prstGeom>
+          <a:noFill/>
+          <a:ln>
+            <a:noFill/>
+          </a:ln>
+        </p:spPr>
+        <p:style>
+          <a:lnRef idx="2">
+            <a:schemeClr val="accent1">
+              <a:shade val="15000"/>
+            </a:schemeClr>
+          </a:lnRef>
+          <a:fillRef idx="1">
+            <a:schemeClr val="accent1"/>
+          </a:fillRef>
+          <a:effectRef idx="0">
+            <a:schemeClr val="accent1"/>
+          </a:effectRef>
+          <a:fontRef idx="minor">
+            <a:schemeClr val="lt1"/>
+          </a:fontRef>
+        </p:style>
+        <p:txBody>
+          <a:bodyPr rtlCol="0" anchor="ctr"/>
+          <a:lstStyle/>
+          <a:p>
+            <a:pPr algn="ctr"/>
+            <a:r>
+              <a:rPr lang="en-US" dirty="0">
+                <a:solidFill>
+                  <a:schemeClr val="tx1"/>
+                </a:solidFill>
+              </a:rPr>
+              <a:t>…</a:t>
+            </a:r>
+          </a:p>
+        </p:txBody>
+      </p:sp>
+      <p:sp>
+        <p:nvSpPr>
+          <p:cNvPr id="2" name="矩形 1">
+            <a:extLst>
+              <a:ext uri="{FF2B5EF4-FFF2-40B4-BE49-F238E27FC236}">
+                <a16:creationId xmlns:a16="http://schemas.microsoft.com/office/drawing/2014/main" id="{AB0F26E4-30C6-E58B-59FD-CC69A5B27CA2}"/>
+              </a:ext>
+            </a:extLst>
+          </p:cNvPr>
+          <p:cNvSpPr/>
+          <p:nvPr/>
+        </p:nvSpPr>
+        <p:spPr>
+          <a:xfrm>
+            <a:off x="3545438" y="1107493"/>
+            <a:ext cx="2067338" cy="498669"/>
+          </a:xfrm>
+          <a:prstGeom prst="rect">
+            <a:avLst/>
+          </a:prstGeom>
+          <a:solidFill>
+            <a:schemeClr val="accent6">
+              <a:lumMod val="40000"/>
+              <a:lumOff val="60000"/>
+            </a:schemeClr>
+          </a:solidFill>
+        </p:spPr>
+        <p:style>
+          <a:lnRef idx="2">
+            <a:schemeClr val="accent1">
+              <a:shade val="15000"/>
+            </a:schemeClr>
+          </a:lnRef>
+          <a:fillRef idx="1">
+            <a:schemeClr val="accent1"/>
+          </a:fillRef>
+          <a:effectRef idx="0">
+            <a:schemeClr val="accent1"/>
+          </a:effectRef>
+          <a:fontRef idx="minor">
+            <a:schemeClr val="lt1"/>
+          </a:fontRef>
+        </p:style>
+        <p:txBody>
+          <a:bodyPr rtlCol="0" anchor="ctr"/>
+          <a:lstStyle/>
+          <a:p>
+            <a:pPr algn="ctr"/>
+            <a:r>
+              <a:rPr lang="en-US" dirty="0" err="1">
+                <a:solidFill>
+                  <a:schemeClr val="tx1"/>
+                </a:solidFill>
+              </a:rPr>
+              <a:t>数据</a:t>
+            </a:r>
+            <a:endParaRPr lang="en-US" dirty="0">
+              <a:solidFill>
+                <a:schemeClr val="tx1"/>
+              </a:solidFill>
+            </a:endParaRPr>
+          </a:p>
+        </p:txBody>
+      </p:sp>
+      <p:sp>
+        <p:nvSpPr>
+          <p:cNvPr id="8" name="矩形 7">
+            <a:extLst>
+              <a:ext uri="{FF2B5EF4-FFF2-40B4-BE49-F238E27FC236}">
+                <a16:creationId xmlns:a16="http://schemas.microsoft.com/office/drawing/2014/main" id="{44508D7C-EDFE-B467-3C46-94E78BC02AC2}"/>
+              </a:ext>
+            </a:extLst>
+          </p:cNvPr>
+          <p:cNvSpPr/>
+          <p:nvPr/>
+        </p:nvSpPr>
+        <p:spPr>
+          <a:xfrm>
+            <a:off x="3545438" y="1749149"/>
+            <a:ext cx="2067338" cy="498669"/>
+          </a:xfrm>
+          <a:prstGeom prst="rect">
+            <a:avLst/>
+          </a:prstGeom>
+          <a:solidFill>
+            <a:schemeClr val="accent6">
+              <a:lumMod val="40000"/>
+              <a:lumOff val="60000"/>
+            </a:schemeClr>
+          </a:solidFill>
+        </p:spPr>
+        <p:style>
+          <a:lnRef idx="2">
+            <a:schemeClr val="accent1">
+              <a:shade val="15000"/>
+            </a:schemeClr>
+          </a:lnRef>
+          <a:fillRef idx="1">
+            <a:schemeClr val="accent1"/>
+          </a:fillRef>
+          <a:effectRef idx="0">
+            <a:schemeClr val="accent1"/>
+          </a:effectRef>
+          <a:fontRef idx="minor">
+            <a:schemeClr val="lt1"/>
+          </a:fontRef>
+        </p:style>
+        <p:txBody>
+          <a:bodyPr rtlCol="0" anchor="ctr"/>
+          <a:lstStyle/>
+          <a:p>
+            <a:pPr algn="ctr"/>
+            <a:r>
+              <a:rPr lang="en-US" dirty="0" err="1">
+                <a:solidFill>
+                  <a:schemeClr val="tx1"/>
+                </a:solidFill>
+              </a:rPr>
+              <a:t>工作队列WQ</a:t>
+            </a:r>
+            <a:endParaRPr lang="en-US" dirty="0">
+              <a:solidFill>
+                <a:schemeClr val="tx1"/>
+              </a:solidFill>
+            </a:endParaRPr>
+          </a:p>
+        </p:txBody>
+      </p:sp>
+      <p:sp>
+        <p:nvSpPr>
+          <p:cNvPr id="24" name="矩形 23">
+            <a:extLst>
+              <a:ext uri="{FF2B5EF4-FFF2-40B4-BE49-F238E27FC236}">
+                <a16:creationId xmlns:a16="http://schemas.microsoft.com/office/drawing/2014/main" id="{84F8E8E4-3DEC-DB8D-0CA8-6C2EDA344415}"/>
+              </a:ext>
+            </a:extLst>
+          </p:cNvPr>
+          <p:cNvSpPr/>
+          <p:nvPr/>
+        </p:nvSpPr>
+        <p:spPr>
+          <a:xfrm>
+            <a:off x="3545438" y="2419318"/>
+            <a:ext cx="2067338" cy="498669"/>
+          </a:xfrm>
+          <a:prstGeom prst="rect">
+            <a:avLst/>
+          </a:prstGeom>
+          <a:solidFill>
+            <a:schemeClr val="accent6">
+              <a:lumMod val="40000"/>
+              <a:lumOff val="60000"/>
+            </a:schemeClr>
+          </a:solidFill>
+        </p:spPr>
+        <p:style>
+          <a:lnRef idx="2">
+            <a:schemeClr val="accent1">
+              <a:shade val="15000"/>
+            </a:schemeClr>
+          </a:lnRef>
+          <a:fillRef idx="1">
+            <a:schemeClr val="accent1"/>
+          </a:fillRef>
+          <a:effectRef idx="0">
+            <a:schemeClr val="accent1"/>
+          </a:effectRef>
+          <a:fontRef idx="minor">
+            <a:schemeClr val="lt1"/>
+          </a:fontRef>
+        </p:style>
+        <p:txBody>
+          <a:bodyPr rtlCol="0" anchor="ctr"/>
+          <a:lstStyle/>
+          <a:p>
+            <a:pPr algn="ctr"/>
+            <a:r>
+              <a:rPr lang="en-US" dirty="0" err="1">
+                <a:solidFill>
+                  <a:schemeClr val="tx1"/>
+                </a:solidFill>
+              </a:rPr>
+              <a:t>门铃记录DBR</a:t>
+            </a:r>
+            <a:endParaRPr lang="en-US" dirty="0">
+              <a:solidFill>
+                <a:schemeClr val="tx1"/>
+              </a:solidFill>
+            </a:endParaRPr>
+          </a:p>
+        </p:txBody>
+      </p:sp>
+      <p:sp>
+        <p:nvSpPr>
+          <p:cNvPr id="34" name="矩形 33">
+            <a:extLst>
+              <a:ext uri="{FF2B5EF4-FFF2-40B4-BE49-F238E27FC236}">
+                <a16:creationId xmlns:a16="http://schemas.microsoft.com/office/drawing/2014/main" id="{6738E01A-BE86-0AA1-661B-A1A1FF4DD6BF}"/>
+              </a:ext>
+            </a:extLst>
+          </p:cNvPr>
+          <p:cNvSpPr/>
+          <p:nvPr/>
+        </p:nvSpPr>
+        <p:spPr>
+          <a:xfrm>
+            <a:off x="3545438" y="3089487"/>
+            <a:ext cx="2067338" cy="498669"/>
+          </a:xfrm>
+          <a:prstGeom prst="rect">
+            <a:avLst/>
+          </a:prstGeom>
+          <a:solidFill>
+            <a:schemeClr val="accent6">
+              <a:lumMod val="40000"/>
+              <a:lumOff val="60000"/>
+            </a:schemeClr>
+          </a:solidFill>
+        </p:spPr>
+        <p:style>
+          <a:lnRef idx="2">
+            <a:schemeClr val="accent1">
+              <a:shade val="15000"/>
+            </a:schemeClr>
+          </a:lnRef>
+          <a:fillRef idx="1">
+            <a:schemeClr val="accent1"/>
+          </a:fillRef>
+          <a:effectRef idx="0">
+            <a:schemeClr val="accent1"/>
+          </a:effectRef>
+          <a:fontRef idx="minor">
+            <a:schemeClr val="lt1"/>
+          </a:fontRef>
+        </p:style>
+        <p:txBody>
+          <a:bodyPr rtlCol="0" anchor="ctr"/>
+          <a:lstStyle/>
+          <a:p>
+            <a:pPr algn="ctr"/>
+            <a:r>
+              <a:rPr lang="en-US" dirty="0" err="1">
+                <a:solidFill>
+                  <a:schemeClr val="tx1"/>
+                </a:solidFill>
+              </a:rPr>
+              <a:t>完成队列CQ</a:t>
+            </a:r>
+            <a:endParaRPr lang="en-US" dirty="0">
+              <a:solidFill>
+                <a:schemeClr val="tx1"/>
+              </a:solidFill>
+            </a:endParaRPr>
+          </a:p>
+        </p:txBody>
+      </p:sp>
+      <p:sp>
+        <p:nvSpPr>
+          <p:cNvPr id="37" name="矩形 36">
+            <a:extLst>
+              <a:ext uri="{FF2B5EF4-FFF2-40B4-BE49-F238E27FC236}">
+                <a16:creationId xmlns:a16="http://schemas.microsoft.com/office/drawing/2014/main" id="{F8CE97C3-D0CB-DF2A-1FFD-66A8ACF1972C}"/>
+              </a:ext>
+            </a:extLst>
+          </p:cNvPr>
+          <p:cNvSpPr/>
+          <p:nvPr/>
+        </p:nvSpPr>
+        <p:spPr>
+          <a:xfrm>
+            <a:off x="2505494" y="4604808"/>
+            <a:ext cx="2401613" cy="668867"/>
+          </a:xfrm>
+          <a:prstGeom prst="rect">
+            <a:avLst/>
+          </a:prstGeom>
+          <a:noFill/>
+          <a:ln w="57150">
+            <a:solidFill>
+              <a:schemeClr val="tx2">
+                <a:lumMod val="75000"/>
+                <a:lumOff val="25000"/>
+              </a:schemeClr>
+            </a:solidFill>
+          </a:ln>
+        </p:spPr>
+        <p:style>
+          <a:lnRef idx="2">
+            <a:schemeClr val="accent1">
+              <a:shade val="15000"/>
+            </a:schemeClr>
+          </a:lnRef>
+          <a:fillRef idx="1">
+            <a:schemeClr val="accent1"/>
+          </a:fillRef>
+          <a:effectRef idx="0">
+            <a:schemeClr val="accent1"/>
+          </a:effectRef>
+          <a:fontRef idx="minor">
+            <a:schemeClr val="lt1"/>
+          </a:fontRef>
+        </p:style>
+        <p:txBody>
+          <a:bodyPr rtlCol="0" anchor="ctr"/>
+          <a:lstStyle/>
+          <a:p>
+            <a:pPr algn="ctr"/>
+            <a:r>
+              <a:rPr lang="en-US" dirty="0" err="1">
+                <a:solidFill>
+                  <a:schemeClr val="tx1"/>
+                </a:solidFill>
+              </a:rPr>
+              <a:t>网卡</a:t>
+            </a:r>
+            <a:endParaRPr lang="en-US" dirty="0">
+              <a:solidFill>
+                <a:schemeClr val="tx1"/>
+              </a:solidFill>
+            </a:endParaRPr>
+          </a:p>
+        </p:txBody>
+      </p:sp>
+      <p:cxnSp>
+        <p:nvCxnSpPr>
+          <p:cNvPr id="43" name="肘形连接符 42">
+            <a:extLst>
+              <a:ext uri="{FF2B5EF4-FFF2-40B4-BE49-F238E27FC236}">
+                <a16:creationId xmlns:a16="http://schemas.microsoft.com/office/drawing/2014/main" id="{D8ABDF95-6C78-717C-58D6-7E2CE6BC7404}"/>
+              </a:ext>
+            </a:extLst>
+          </p:cNvPr>
+          <p:cNvCxnSpPr>
+            <a:cxnSpLocks/>
+            <a:stCxn id="9" idx="1"/>
+            <a:endCxn id="37" idx="1"/>
+          </p:cNvCxnSpPr>
+          <p:nvPr/>
+        </p:nvCxnSpPr>
+        <p:spPr>
+          <a:xfrm rot="10800000" flipH="1" flipV="1">
+            <a:off x="1649894" y="1434492"/>
+            <a:ext cx="855599" cy="3504750"/>
+          </a:xfrm>
+          <a:prstGeom prst="bentConnector3">
+            <a:avLst>
+              <a:gd name="adj1" fmla="val -120528"/>
+            </a:avLst>
+          </a:prstGeom>
+          <a:ln w="28575">
+            <a:solidFill>
+              <a:schemeClr val="accent6">
+                <a:lumMod val="75000"/>
+              </a:schemeClr>
+            </a:solidFill>
+            <a:tailEnd type="triangle"/>
+          </a:ln>
+        </p:spPr>
+        <p:style>
+          <a:lnRef idx="2">
+            <a:schemeClr val="accent1"/>
+          </a:lnRef>
+          <a:fillRef idx="0">
+            <a:schemeClr val="accent1"/>
+          </a:fillRef>
+          <a:effectRef idx="1">
+            <a:schemeClr val="accent1"/>
+          </a:effectRef>
+          <a:fontRef idx="minor">
+            <a:schemeClr val="tx1"/>
+          </a:fontRef>
+        </p:style>
+      </p:cxnSp>
+      <p:cxnSp>
+        <p:nvCxnSpPr>
+          <p:cNvPr id="48" name="直线箭头连接符 47">
+            <a:extLst>
+              <a:ext uri="{FF2B5EF4-FFF2-40B4-BE49-F238E27FC236}">
+                <a16:creationId xmlns:a16="http://schemas.microsoft.com/office/drawing/2014/main" id="{3453EED7-D151-83AA-248C-E3E296A87414}"/>
+              </a:ext>
+            </a:extLst>
+          </p:cNvPr>
+          <p:cNvCxnSpPr>
+            <a:cxnSpLocks/>
+          </p:cNvCxnSpPr>
+          <p:nvPr/>
+        </p:nvCxnSpPr>
+        <p:spPr>
+          <a:xfrm>
+            <a:off x="4907107" y="4919991"/>
+            <a:ext cx="2264255" cy="0"/>
+          </a:xfrm>
+          <a:prstGeom prst="straightConnector1">
+            <a:avLst/>
+          </a:prstGeom>
+          <a:ln w="28575">
+            <a:tailEnd type="triangle"/>
+          </a:ln>
+        </p:spPr>
+        <p:style>
+          <a:lnRef idx="2">
+            <a:schemeClr val="accent1"/>
+          </a:lnRef>
+          <a:fillRef idx="0">
+            <a:schemeClr val="accent1"/>
+          </a:fillRef>
+          <a:effectRef idx="1">
+            <a:schemeClr val="accent1"/>
+          </a:effectRef>
+          <a:fontRef idx="minor">
+            <a:schemeClr val="tx1"/>
+          </a:fontRef>
+        </p:style>
+      </p:cxnSp>
+      <p:cxnSp>
+        <p:nvCxnSpPr>
+          <p:cNvPr id="75" name="直线箭头连接符 74">
+            <a:extLst>
+              <a:ext uri="{FF2B5EF4-FFF2-40B4-BE49-F238E27FC236}">
+                <a16:creationId xmlns:a16="http://schemas.microsoft.com/office/drawing/2014/main" id="{E3D59522-3789-C1C2-A7C2-84382F6C94E5}"/>
+              </a:ext>
+            </a:extLst>
+          </p:cNvPr>
+          <p:cNvCxnSpPr/>
+          <p:nvPr/>
+        </p:nvCxnSpPr>
+        <p:spPr>
+          <a:xfrm flipV="1">
+            <a:off x="4196080" y="3588156"/>
+            <a:ext cx="0" cy="1016652"/>
+          </a:xfrm>
+          <a:prstGeom prst="straightConnector1">
+            <a:avLst/>
+          </a:prstGeom>
+          <a:ln w="28575">
+            <a:tailEnd type="triangle"/>
+          </a:ln>
+        </p:spPr>
+        <p:style>
+          <a:lnRef idx="2">
+            <a:schemeClr val="accent1"/>
+          </a:lnRef>
+          <a:fillRef idx="0">
+            <a:schemeClr val="accent1"/>
+          </a:fillRef>
+          <a:effectRef idx="1">
+            <a:schemeClr val="accent1"/>
+          </a:effectRef>
+          <a:fontRef idx="minor">
+            <a:schemeClr val="tx1"/>
+          </a:fontRef>
+        </p:style>
+      </p:cxnSp>
+      <p:sp>
+        <p:nvSpPr>
+          <p:cNvPr id="76" name="矩形 75">
+            <a:extLst>
+              <a:ext uri="{FF2B5EF4-FFF2-40B4-BE49-F238E27FC236}">
+                <a16:creationId xmlns:a16="http://schemas.microsoft.com/office/drawing/2014/main" id="{DD536BF6-F9C6-A6A3-59A3-D18A9E60CDA1}"/>
+              </a:ext>
+            </a:extLst>
+          </p:cNvPr>
+          <p:cNvSpPr/>
+          <p:nvPr/>
+        </p:nvSpPr>
+        <p:spPr>
+          <a:xfrm>
+            <a:off x="1430417" y="253721"/>
+            <a:ext cx="1014608" cy="476804"/>
+          </a:xfrm>
+          <a:prstGeom prst="rect">
+            <a:avLst/>
+          </a:prstGeom>
+          <a:solidFill>
+            <a:schemeClr val="bg1"/>
+          </a:solidFill>
+          <a:ln w="57150">
+            <a:solidFill>
+              <a:schemeClr val="accent6">
+                <a:lumMod val="75000"/>
+              </a:schemeClr>
+            </a:solidFill>
+          </a:ln>
+        </p:spPr>
+        <p:style>
+          <a:lnRef idx="2">
+            <a:schemeClr val="accent1">
+              <a:shade val="15000"/>
+            </a:schemeClr>
+          </a:lnRef>
+          <a:fillRef idx="1">
+            <a:schemeClr val="accent1"/>
+          </a:fillRef>
+          <a:effectRef idx="0">
+            <a:schemeClr val="accent1"/>
+          </a:effectRef>
+          <a:fontRef idx="minor">
+            <a:schemeClr val="lt1"/>
+          </a:fontRef>
+        </p:style>
+        <p:txBody>
+          <a:bodyPr rtlCol="0" anchor="ctr"/>
+          <a:lstStyle/>
+          <a:p>
+            <a:pPr algn="ctr"/>
+            <a:r>
+              <a:rPr lang="en-US" dirty="0">
+                <a:solidFill>
+                  <a:schemeClr val="tx1"/>
+                </a:solidFill>
+              </a:rPr>
+              <a:t>GPU</a:t>
+            </a:r>
+          </a:p>
+        </p:txBody>
+      </p:sp>
+      <p:cxnSp>
+        <p:nvCxnSpPr>
+          <p:cNvPr id="78" name="肘形连接符 77">
+            <a:extLst>
+              <a:ext uri="{FF2B5EF4-FFF2-40B4-BE49-F238E27FC236}">
+                <a16:creationId xmlns:a16="http://schemas.microsoft.com/office/drawing/2014/main" id="{A403D669-3964-7BEF-3164-0AF8EE1C2456}"/>
+              </a:ext>
+            </a:extLst>
+          </p:cNvPr>
+          <p:cNvCxnSpPr>
+            <a:cxnSpLocks/>
+            <a:stCxn id="2" idx="3"/>
+          </p:cNvCxnSpPr>
+          <p:nvPr/>
+        </p:nvCxnSpPr>
+        <p:spPr>
+          <a:xfrm flipH="1">
+            <a:off x="4907107" y="1356828"/>
+            <a:ext cx="705669" cy="3438692"/>
+          </a:xfrm>
+          <a:prstGeom prst="bentConnector4">
+            <a:avLst>
+              <a:gd name="adj1" fmla="val -128859"/>
+              <a:gd name="adj2" fmla="val 100273"/>
+            </a:avLst>
+          </a:prstGeom>
+          <a:ln w="28575">
+            <a:headEnd type="triangle"/>
+            <a:tailEnd type="triangle"/>
+          </a:ln>
+        </p:spPr>
+        <p:style>
+          <a:lnRef idx="2">
+            <a:schemeClr val="accent1"/>
+          </a:lnRef>
+          <a:fillRef idx="0">
+            <a:schemeClr val="accent1"/>
+          </a:fillRef>
+          <a:effectRef idx="1">
+            <a:schemeClr val="accent1"/>
+          </a:effectRef>
+          <a:fontRef idx="minor">
+            <a:schemeClr val="tx1"/>
+          </a:fontRef>
+        </p:style>
+      </p:cxnSp>
+      <p:cxnSp>
+        <p:nvCxnSpPr>
+          <p:cNvPr id="87" name="肘形连接符 86">
+            <a:extLst>
+              <a:ext uri="{FF2B5EF4-FFF2-40B4-BE49-F238E27FC236}">
+                <a16:creationId xmlns:a16="http://schemas.microsoft.com/office/drawing/2014/main" id="{EAFA3220-B2A2-3B97-396F-14A5339FEA4A}"/>
+              </a:ext>
+            </a:extLst>
+          </p:cNvPr>
+          <p:cNvCxnSpPr>
+            <a:cxnSpLocks/>
+            <a:stCxn id="8" idx="3"/>
+          </p:cNvCxnSpPr>
+          <p:nvPr/>
+        </p:nvCxnSpPr>
+        <p:spPr>
+          <a:xfrm flipH="1">
+            <a:off x="4907106" y="1998484"/>
+            <a:ext cx="705670" cy="2725916"/>
+          </a:xfrm>
+          <a:prstGeom prst="bentConnector4">
+            <a:avLst>
+              <a:gd name="adj1" fmla="val -110142"/>
+              <a:gd name="adj2" fmla="val 100050"/>
+            </a:avLst>
+          </a:prstGeom>
+          <a:ln w="28575">
+            <a:headEnd type="triangle"/>
+            <a:tailEnd type="triangle"/>
+          </a:ln>
+        </p:spPr>
+        <p:style>
+          <a:lnRef idx="2">
+            <a:schemeClr val="accent1"/>
+          </a:lnRef>
+          <a:fillRef idx="0">
+            <a:schemeClr val="accent1"/>
+          </a:fillRef>
+          <a:effectRef idx="1">
+            <a:schemeClr val="accent1"/>
+          </a:effectRef>
+          <a:fontRef idx="minor">
+            <a:schemeClr val="tx1"/>
+          </a:fontRef>
+        </p:style>
+      </p:cxnSp>
+      <p:cxnSp>
+        <p:nvCxnSpPr>
+          <p:cNvPr id="6" name="肘形连接符 5">
+            <a:extLst>
+              <a:ext uri="{FF2B5EF4-FFF2-40B4-BE49-F238E27FC236}">
+                <a16:creationId xmlns:a16="http://schemas.microsoft.com/office/drawing/2014/main" id="{94CFAB4E-EA4A-CDE8-1026-75CCB4BC4AB0}"/>
+              </a:ext>
+            </a:extLst>
+          </p:cNvPr>
+          <p:cNvCxnSpPr>
+            <a:stCxn id="9" idx="3"/>
+            <a:endCxn id="2" idx="1"/>
+          </p:cNvCxnSpPr>
+          <p:nvPr/>
+        </p:nvCxnSpPr>
+        <p:spPr>
+          <a:xfrm flipV="1">
+            <a:off x="2445025" y="1356828"/>
+            <a:ext cx="1100413" cy="77664"/>
+          </a:xfrm>
+          <a:prstGeom prst="bentConnector3">
+            <a:avLst/>
+          </a:prstGeom>
+          <a:ln>
+            <a:tailEnd type="triangle"/>
+          </a:ln>
+        </p:spPr>
+        <p:style>
+          <a:lnRef idx="2">
+            <a:schemeClr val="accent1"/>
+          </a:lnRef>
+          <a:fillRef idx="0">
+            <a:schemeClr val="accent1"/>
+          </a:fillRef>
+          <a:effectRef idx="1">
+            <a:schemeClr val="accent1"/>
+          </a:effectRef>
+          <a:fontRef idx="minor">
+            <a:schemeClr val="tx1"/>
+          </a:fontRef>
+        </p:style>
+      </p:cxnSp>
+      <p:cxnSp>
+        <p:nvCxnSpPr>
+          <p:cNvPr id="18" name="肘形连接符 17">
+            <a:extLst>
+              <a:ext uri="{FF2B5EF4-FFF2-40B4-BE49-F238E27FC236}">
+                <a16:creationId xmlns:a16="http://schemas.microsoft.com/office/drawing/2014/main" id="{7A6361F9-AD75-0116-6D85-111D750A99AD}"/>
+              </a:ext>
+            </a:extLst>
+          </p:cNvPr>
+          <p:cNvCxnSpPr>
+            <a:stCxn id="9" idx="3"/>
+            <a:endCxn id="8" idx="1"/>
+          </p:cNvCxnSpPr>
+          <p:nvPr/>
+        </p:nvCxnSpPr>
+        <p:spPr>
+          <a:xfrm>
+            <a:off x="2445025" y="1434492"/>
+            <a:ext cx="1100413" cy="563992"/>
+          </a:xfrm>
+          <a:prstGeom prst="bentConnector3">
+            <a:avLst/>
+          </a:prstGeom>
+          <a:ln>
+            <a:tailEnd type="triangle"/>
+          </a:ln>
+        </p:spPr>
+        <p:style>
+          <a:lnRef idx="2">
+            <a:schemeClr val="accent1"/>
+          </a:lnRef>
+          <a:fillRef idx="0">
+            <a:schemeClr val="accent1"/>
+          </a:fillRef>
+          <a:effectRef idx="1">
+            <a:schemeClr val="accent1"/>
+          </a:effectRef>
+          <a:fontRef idx="minor">
+            <a:schemeClr val="tx1"/>
+          </a:fontRef>
+        </p:style>
+      </p:cxnSp>
+      <p:cxnSp>
+        <p:nvCxnSpPr>
+          <p:cNvPr id="20" name="肘形连接符 19">
+            <a:extLst>
+              <a:ext uri="{FF2B5EF4-FFF2-40B4-BE49-F238E27FC236}">
+                <a16:creationId xmlns:a16="http://schemas.microsoft.com/office/drawing/2014/main" id="{32FFE15C-E006-25D9-22F1-965B147B474C}"/>
+              </a:ext>
+            </a:extLst>
+          </p:cNvPr>
+          <p:cNvCxnSpPr>
+            <a:cxnSpLocks/>
+            <a:endCxn id="24" idx="1"/>
+          </p:cNvCxnSpPr>
+          <p:nvPr/>
+        </p:nvCxnSpPr>
+        <p:spPr>
+          <a:xfrm rot="16200000" flipH="1">
+            <a:off x="2377989" y="1501204"/>
+            <a:ext cx="1234484" cy="1100414"/>
+          </a:xfrm>
+          <a:prstGeom prst="bentConnector2">
+            <a:avLst/>
+          </a:prstGeom>
+          <a:ln>
+            <a:tailEnd type="triangle"/>
+          </a:ln>
+        </p:spPr>
+        <p:style>
+          <a:lnRef idx="2">
+            <a:schemeClr val="accent1"/>
+          </a:lnRef>
+          <a:fillRef idx="0">
+            <a:schemeClr val="accent1"/>
+          </a:fillRef>
+          <a:effectRef idx="1">
+            <a:schemeClr val="accent1"/>
+          </a:effectRef>
+          <a:fontRef idx="minor">
+            <a:schemeClr val="tx1"/>
+          </a:fontRef>
+        </p:style>
+      </p:cxnSp>
+    </p:spTree>
+    <p:extLst>
+      <p:ext uri="{BB962C8B-B14F-4D97-AF65-F5344CB8AC3E}">
+        <p14:creationId xmlns:p14="http://schemas.microsoft.com/office/powerpoint/2010/main" val="1071843204"/>
+      </p:ext>
+    </p:extLst>
+  </p:cSld>
+  <p:clrMapOvr>
+    <a:masterClrMapping/>
+  </p:clrMapOvr>
+</p:sld>
+</file>
+
+<file path=ppt/slides/slide11.xml><?xml version="1.0" encoding="utf-8"?>
 <p:sld xmlns:a="http://schemas.openxmlformats.org/drawingml/2006/main" xmlns:r="http://schemas.openxmlformats.org/officeDocument/2006/relationships" xmlns:p="http://schemas.openxmlformats.org/presentationml/2006/main" show="0">
   <p:cSld>
     <p:spTree>
@@ -6928,7 +8109,7 @@
 </p:sld>
 </file>
 
-<file path=ppt/slides/slide11.xml><?xml version="1.0" encoding="utf-8"?>
+<file path=ppt/slides/slide12.xml><?xml version="1.0" encoding="utf-8"?>
 <p:sld xmlns:a="http://schemas.openxmlformats.org/drawingml/2006/main" xmlns:r="http://schemas.openxmlformats.org/officeDocument/2006/relationships" xmlns:p="http://schemas.openxmlformats.org/presentationml/2006/main">
   <p:cSld>
     <p:spTree>
@@ -9630,7 +10811,7 @@
 </p:sld>
 </file>
 
-<file path=ppt/slides/slide12.xml><?xml version="1.0" encoding="utf-8"?>
+<file path=ppt/slides/slide13.xml><?xml version="1.0" encoding="utf-8"?>
 <p:sld xmlns:a="http://schemas.openxmlformats.org/drawingml/2006/main" xmlns:r="http://schemas.openxmlformats.org/officeDocument/2006/relationships" xmlns:p="http://schemas.openxmlformats.org/presentationml/2006/main">
   <p:cSld>
     <p:spTree>
@@ -11057,7 +12238,7 @@
 </p:sld>
 </file>
 
-<file path=ppt/slides/slide13.xml><?xml version="1.0" encoding="utf-8"?>
+<file path=ppt/slides/slide14.xml><?xml version="1.0" encoding="utf-8"?>
 <p:sld xmlns:a="http://schemas.openxmlformats.org/drawingml/2006/main" xmlns:r="http://schemas.openxmlformats.org/officeDocument/2006/relationships" xmlns:p="http://schemas.openxmlformats.org/presentationml/2006/main">
   <p:cSld>
     <p:spTree>
@@ -14110,7 +15291,7 @@
 </p:sld>
 </file>
 
-<file path=ppt/slides/slide14.xml><?xml version="1.0" encoding="utf-8"?>
+<file path=ppt/slides/slide15.xml><?xml version="1.0" encoding="utf-8"?>
 <p:sld xmlns:a="http://schemas.openxmlformats.org/drawingml/2006/main" xmlns:r="http://schemas.openxmlformats.org/officeDocument/2006/relationships" xmlns:p="http://schemas.openxmlformats.org/presentationml/2006/main">
   <p:cSld>
     <p:spTree>
@@ -15562,7 +16743,7 @@
 </p:sld>
 </file>
 
-<file path=ppt/slides/slide15.xml><?xml version="1.0" encoding="utf-8"?>
+<file path=ppt/slides/slide16.xml><?xml version="1.0" encoding="utf-8"?>
 <p:sld xmlns:a="http://schemas.openxmlformats.org/drawingml/2006/main" xmlns:r="http://schemas.openxmlformats.org/officeDocument/2006/relationships" xmlns:p="http://schemas.openxmlformats.org/presentationml/2006/main">
   <p:cSld>
     <p:spTree>
@@ -18131,7 +19312,7 @@
 </p:sld>
 </file>
 
-<file path=ppt/slides/slide16.xml><?xml version="1.0" encoding="utf-8"?>
+<file path=ppt/slides/slide17.xml><?xml version="1.0" encoding="utf-8"?>
 <p:sld xmlns:a="http://schemas.openxmlformats.org/drawingml/2006/main" xmlns:r="http://schemas.openxmlformats.org/officeDocument/2006/relationships" xmlns:p="http://schemas.openxmlformats.org/presentationml/2006/main">
   <p:cSld>
     <p:spTree>
@@ -20591,7 +21772,7 @@
 </p:sld>
 </file>
 
-<file path=ppt/slides/slide17.xml><?xml version="1.0" encoding="utf-8"?>
+<file path=ppt/slides/slide18.xml><?xml version="1.0" encoding="utf-8"?>
 <p:sld xmlns:a="http://schemas.openxmlformats.org/drawingml/2006/main" xmlns:r="http://schemas.openxmlformats.org/officeDocument/2006/relationships" xmlns:p="http://schemas.openxmlformats.org/presentationml/2006/main">
   <p:cSld>
     <p:spTree>

</xml_diff>